<commit_message>
Update agenda in the lecture.
</commit_message>
<xml_diff>
--- a/webpack-introduction.pptx
+++ b/webpack-introduction.pptx
@@ -301,7 +301,7 @@
           <a:p>
             <a:fld id="{D13DFB7A-6BDE-4A91-AA23-4B1C85352FC7}" type="datetimeFigureOut">
               <a:rPr lang="en-US" smtClean="0"/>
-              <a:t>4/12/2017</a:t>
+              <a:t>4/13/2017</a:t>
             </a:fld>
             <a:endParaRPr lang="en-US"/>
           </a:p>
@@ -5357,24 +5357,21 @@
             </a:r>
           </a:p>
           <a:p>
-            <a:pPr marL="995363" lvl="1" indent="-457200">
-              <a:buFontTx/>
-              <a:buChar char="-"/>
-            </a:pPr>
-            <a:r>
-              <a:rPr lang="en-US" dirty="0"/>
-              <a:t>Angular.js</a:t>
-            </a:r>
-          </a:p>
-          <a:p>
             <a:pPr marL="457200" indent="-457200">
               <a:buFontTx/>
               <a:buChar char="-"/>
             </a:pPr>
             <a:r>
               <a:rPr lang="en-US" dirty="0"/>
-              <a:t>	</a:t>
-            </a:r>
+              <a:t>Comparison with similar tools</a:t>
+            </a:r>
+          </a:p>
+          <a:p>
+            <a:pPr marL="457200" indent="-457200">
+              <a:buFontTx/>
+              <a:buChar char="-"/>
+            </a:pPr>
+            <a:endParaRPr lang="en-US" dirty="0"/>
           </a:p>
           <a:p>
             <a:pPr marL="995363" lvl="1" indent="-457200">

</xml_diff>